<commit_message>
exersize and solution of lecture 1
</commit_message>
<xml_diff>
--- a/lecture 1 - Spring boot introduction/Spring boot introduction.pptx
+++ b/lecture 1 - Spring boot introduction/Spring boot introduction.pptx
@@ -36,7 +36,6 @@
     <p:sldId id="284" r:id="rId30"/>
     <p:sldId id="285" r:id="rId31"/>
     <p:sldId id="286" r:id="rId32"/>
-    <p:sldId id="287" r:id="rId33"/>
   </p:sldIdLst>
   <p:sldSz cx="9144000" cy="6858000" type="screen4x3"/>
   <p:notesSz cx="6858000" cy="9144000"/>
@@ -4226,18 +4225,7 @@
                 <a:ea typeface="+mj-ea"/>
                 <a:cs typeface="+mj-cs"/>
               </a:rPr>
-              <a:t>Embedded </a:t>
-            </a:r>
-            <a:r>
-              <a:rPr lang="en-GB" b="1" dirty="0" smtClean="0">
-                <a:solidFill>
-                  <a:schemeClr val="tx2"/>
-                </a:solidFill>
-                <a:latin typeface="+mj-lt"/>
-                <a:ea typeface="+mj-ea"/>
-                <a:cs typeface="+mj-cs"/>
-              </a:rPr>
-              <a:t>Servers</a:t>
+              <a:t>Embedded Servers</a:t>
             </a:r>
             <a:endParaRPr lang="en-GB" dirty="0"/>
           </a:p>
@@ -4388,29 +4376,7 @@
                 <a:ea typeface="+mj-ea"/>
                 <a:cs typeface="+mj-cs"/>
               </a:rPr>
-              <a:t>Spring Boot </a:t>
-            </a:r>
-            <a:r>
-              <a:rPr lang="en-GB" b="1" dirty="0" smtClean="0">
-                <a:solidFill>
-                  <a:schemeClr val="tx2"/>
-                </a:solidFill>
-                <a:latin typeface="+mj-lt"/>
-                <a:ea typeface="+mj-ea"/>
-                <a:cs typeface="+mj-cs"/>
-              </a:rPr>
-              <a:t>Embedded </a:t>
-            </a:r>
-            <a:r>
-              <a:rPr lang="en-GB" b="1" dirty="0" smtClean="0">
-                <a:solidFill>
-                  <a:schemeClr val="tx2"/>
-                </a:solidFill>
-                <a:latin typeface="+mj-lt"/>
-                <a:ea typeface="+mj-ea"/>
-                <a:cs typeface="+mj-cs"/>
-              </a:rPr>
-              <a:t>Servers</a:t>
+              <a:t>Spring Boot Embedded Servers</a:t>
             </a:r>
             <a:endParaRPr lang="en-GB" dirty="0"/>
           </a:p>
@@ -5065,11 +5031,7 @@
           <a:p>
             <a:r>
               <a:rPr lang="en-US" dirty="0" smtClean="0"/>
-              <a:t>Create an empty </a:t>
-            </a:r>
-            <a:r>
-              <a:rPr lang="en-US" dirty="0" smtClean="0"/>
-              <a:t>project</a:t>
+              <a:t>Create an empty project</a:t>
             </a:r>
             <a:endParaRPr lang="en-GB" dirty="0"/>
           </a:p>
@@ -5628,21 +5590,8 @@
                   <a:schemeClr val="bg1"/>
                 </a:solidFill>
               </a:rPr>
-              <a:t>Starter </a:t>
-            </a:r>
-            <a:r>
-              <a:rPr lang="en-US" dirty="0" smtClean="0">
-                <a:solidFill>
-                  <a:schemeClr val="bg1"/>
-                </a:solidFill>
-              </a:rPr>
-              <a:t>dependencies – Check your project’s dependencies</a:t>
-            </a:r>
-            <a:endParaRPr lang="en-US" dirty="0" smtClean="0">
-              <a:solidFill>
-                <a:schemeClr val="bg1"/>
-              </a:solidFill>
-            </a:endParaRPr>
+              <a:t>Starter dependencies – Check your project’s dependencies</a:t>
+            </a:r>
           </a:p>
         </p:txBody>
       </p:sp>
@@ -6931,15 +6880,7 @@
                   <a:schemeClr val="bg1"/>
                 </a:solidFill>
               </a:rPr>
-              <a:t>Spring Boot </a:t>
-            </a:r>
-            <a:r>
-              <a:rPr lang="en-US" sz="2800" dirty="0">
-                <a:solidFill>
-                  <a:schemeClr val="bg1"/>
-                </a:solidFill>
-              </a:rPr>
-              <a:t>starters-versioning</a:t>
+              <a:t>Spring Boot starters-versioning</a:t>
             </a:r>
           </a:p>
           <a:p>
@@ -6949,33 +6890,17 @@
                   <a:schemeClr val="bg1"/>
                 </a:solidFill>
               </a:rPr>
-              <a:t>Spring Boot Auto </a:t>
-            </a:r>
+              <a:t>Spring Boot Auto Configuration</a:t>
+            </a:r>
+          </a:p>
+          <a:p>
             <a:r>
               <a:rPr lang="en-GB" sz="2800" dirty="0">
                 <a:solidFill>
                   <a:schemeClr val="bg1"/>
                 </a:solidFill>
               </a:rPr>
-              <a:t>Configuration</a:t>
-            </a:r>
-          </a:p>
-          <a:p>
-            <a:r>
-              <a:rPr lang="en-GB" sz="2800" dirty="0">
-                <a:solidFill>
-                  <a:schemeClr val="bg1"/>
-                </a:solidFill>
-              </a:rPr>
-              <a:t>Spring Boot Embedded </a:t>
-            </a:r>
-            <a:r>
-              <a:rPr lang="en-GB" sz="2800" dirty="0">
-                <a:solidFill>
-                  <a:schemeClr val="bg1"/>
-                </a:solidFill>
-              </a:rPr>
-              <a:t>Servers</a:t>
+              <a:t>Spring Boot Embedded Servers</a:t>
             </a:r>
           </a:p>
           <a:p>
@@ -8494,19 +8419,11 @@
           <a:p>
             <a:r>
               <a:rPr lang="en-US" dirty="0" smtClean="0"/>
-              <a:t>Connection </a:t>
-            </a:r>
-            <a:r>
-              <a:rPr lang="en-US" dirty="0" smtClean="0"/>
-              <a:t>with </a:t>
+              <a:t>Connection with </a:t>
             </a:r>
             <a:r>
               <a:rPr lang="en-US" dirty="0" err="1" smtClean="0"/>
-              <a:t>E</a:t>
-            </a:r>
-            <a:r>
-              <a:rPr lang="en-US" dirty="0" err="1" smtClean="0"/>
-              <a:t>lasticSearch</a:t>
+              <a:t>ElasticSearch</a:t>
             </a:r>
             <a:endParaRPr lang="en-GB" dirty="0"/>
           </a:p>
@@ -11225,15 +11142,7 @@
                   <a:schemeClr val="bg1"/>
                 </a:solidFill>
               </a:rPr>
-              <a:t>Less </a:t>
-            </a:r>
-            <a:r>
-              <a:rPr lang="en-US" dirty="0" smtClean="0">
-                <a:solidFill>
-                  <a:schemeClr val="bg1"/>
-                </a:solidFill>
-              </a:rPr>
-              <a:t>typing</a:t>
+              <a:t>Less typing</a:t>
             </a:r>
           </a:p>
           <a:p>
@@ -13235,15 +13144,7 @@
                   <a:schemeClr val="bg1"/>
                 </a:solidFill>
               </a:rPr>
-              <a:t>used to reduce written </a:t>
-            </a:r>
-            <a:r>
-              <a:rPr lang="en-US" dirty="0" smtClean="0">
-                <a:solidFill>
-                  <a:schemeClr val="bg1"/>
-                </a:solidFill>
-              </a:rPr>
-              <a:t>code</a:t>
+              <a:t>used to reduce written code</a:t>
             </a:r>
           </a:p>
           <a:p>
@@ -13269,11 +13170,6 @@
               </a:rPr>
               <a:t>this an elastic search  database entity</a:t>
             </a:r>
-            <a:endParaRPr lang="en-US" dirty="0" smtClean="0">
-              <a:solidFill>
-                <a:schemeClr val="bg1"/>
-              </a:solidFill>
-            </a:endParaRPr>
           </a:p>
         </p:txBody>
       </p:sp>
@@ -22750,225 +22646,6 @@
     <p:extLst>
       <p:ext uri="{BB962C8B-B14F-4D97-AF65-F5344CB8AC3E}">
         <p14:creationId xmlns:p14="http://schemas.microsoft.com/office/powerpoint/2010/main" val="1567494622"/>
-      </p:ext>
-    </p:extLst>
-  </p:cSld>
-  <p:clrMapOvr>
-    <a:masterClrMapping/>
-  </p:clrMapOvr>
-</p:sld>
-</file>
-
-<file path=ppt/slides/slide32.xml><?xml version="1.0" encoding="utf-8"?>
-<p:sld xmlns:a="http://schemas.openxmlformats.org/drawingml/2006/main" xmlns:r="http://schemas.openxmlformats.org/officeDocument/2006/relationships" xmlns:p="http://schemas.openxmlformats.org/presentationml/2006/main">
-  <p:cSld>
-    <p:spTree>
-      <p:nvGrpSpPr>
-        <p:cNvPr id="1" name=""/>
-        <p:cNvGrpSpPr/>
-        <p:nvPr/>
-      </p:nvGrpSpPr>
-      <p:grpSpPr>
-        <a:xfrm>
-          <a:off x="0" y="0"/>
-          <a:ext cx="0" cy="0"/>
-          <a:chOff x="0" y="0"/>
-          <a:chExt cx="0" cy="0"/>
-        </a:xfrm>
-      </p:grpSpPr>
-      <p:sp>
-        <p:nvSpPr>
-          <p:cNvPr id="2" name="Title 1"/>
-          <p:cNvSpPr>
-            <a:spLocks noGrp="1"/>
-          </p:cNvSpPr>
-          <p:nvPr>
-            <p:ph type="title"/>
-          </p:nvPr>
-        </p:nvSpPr>
-        <p:spPr>
-          <a:xfrm>
-            <a:off x="251520" y="0"/>
-            <a:ext cx="8686800" cy="838200"/>
-          </a:xfrm>
-        </p:spPr>
-        <p:txBody>
-          <a:bodyPr/>
-          <a:lstStyle/>
-          <a:p>
-            <a:r>
-              <a:rPr lang="en-US" dirty="0" smtClean="0"/>
-              <a:t>Code</a:t>
-            </a:r>
-            <a:endParaRPr lang="en-GB" dirty="0"/>
-          </a:p>
-        </p:txBody>
-      </p:sp>
-      <p:sp>
-        <p:nvSpPr>
-          <p:cNvPr id="3" name="Content Placeholder 2"/>
-          <p:cNvSpPr>
-            <a:spLocks noGrp="1"/>
-          </p:cNvSpPr>
-          <p:nvPr>
-            <p:ph idx="1"/>
-          </p:nvPr>
-        </p:nvSpPr>
-        <p:spPr/>
-        <p:txBody>
-          <a:bodyPr/>
-          <a:lstStyle/>
-          <a:p>
-            <a:r>
-              <a:rPr lang="en-GB" dirty="0" smtClean="0">
-                <a:solidFill>
-                  <a:schemeClr val="bg1"/>
-                </a:solidFill>
-              </a:rPr>
-              <a:t>Git: https</a:t>
-            </a:r>
-            <a:r>
-              <a:rPr lang="en-GB" dirty="0">
-                <a:solidFill>
-                  <a:schemeClr val="bg1"/>
-                </a:solidFill>
-              </a:rPr>
-              <a:t>://</a:t>
-            </a:r>
-            <a:r>
-              <a:rPr lang="en-GB" dirty="0" smtClean="0">
-                <a:solidFill>
-                  <a:schemeClr val="bg1"/>
-                </a:solidFill>
-              </a:rPr>
-              <a:t>github.com/arongas/eshop.git</a:t>
-            </a:r>
-          </a:p>
-          <a:p>
-            <a:r>
-              <a:rPr lang="en-US" dirty="0">
-                <a:solidFill>
-                  <a:schemeClr val="bg1"/>
-                </a:solidFill>
-              </a:rPr>
-              <a:t>b</a:t>
-            </a:r>
-            <a:r>
-              <a:rPr lang="en-US" dirty="0" smtClean="0">
-                <a:solidFill>
-                  <a:schemeClr val="bg1"/>
-                </a:solidFill>
-              </a:rPr>
-              <a:t>ranch: </a:t>
-            </a:r>
-            <a:r>
-              <a:rPr lang="en-US" dirty="0" err="1" smtClean="0">
-                <a:solidFill>
-                  <a:schemeClr val="bg1"/>
-                </a:solidFill>
-              </a:rPr>
-              <a:t>elasticSearch</a:t>
-            </a:r>
-            <a:r>
-              <a:rPr lang="en-US" dirty="0" smtClean="0">
-                <a:solidFill>
-                  <a:schemeClr val="bg1"/>
-                </a:solidFill>
-              </a:rPr>
-              <a:t> </a:t>
-            </a:r>
-          </a:p>
-          <a:p>
-            <a:pPr marL="0" indent="0">
-              <a:buNone/>
-            </a:pPr>
-            <a:endParaRPr lang="en-US" dirty="0" smtClean="0">
-              <a:solidFill>
-                <a:schemeClr val="bg1"/>
-              </a:solidFill>
-            </a:endParaRPr>
-          </a:p>
-          <a:p>
-            <a:pPr marL="457200" lvl="1" indent="0">
-              <a:buNone/>
-            </a:pPr>
-            <a:r>
-              <a:rPr lang="en-GB" dirty="0">
-                <a:solidFill>
-                  <a:schemeClr val="bg1"/>
-                </a:solidFill>
-              </a:rPr>
-              <a:t>git clone </a:t>
-            </a:r>
-            <a:r>
-              <a:rPr lang="en-GB" dirty="0">
-                <a:solidFill>
-                  <a:schemeClr val="bg1"/>
-                </a:solidFill>
-                <a:hlinkClick r:id="rId2"/>
-              </a:rPr>
-              <a:t>https://</a:t>
-            </a:r>
-            <a:r>
-              <a:rPr lang="en-GB" dirty="0" smtClean="0">
-                <a:solidFill>
-                  <a:schemeClr val="bg1"/>
-                </a:solidFill>
-                <a:hlinkClick r:id="rId2"/>
-              </a:rPr>
-              <a:t>github.com/arongas/eshop.git</a:t>
-            </a:r>
-            <a:endParaRPr lang="en-GB" dirty="0" smtClean="0">
-              <a:solidFill>
-                <a:schemeClr val="bg1"/>
-              </a:solidFill>
-            </a:endParaRPr>
-          </a:p>
-          <a:p>
-            <a:pPr marL="457200" lvl="1" indent="0">
-              <a:buNone/>
-            </a:pPr>
-            <a:r>
-              <a:rPr lang="en-GB" dirty="0">
-                <a:solidFill>
-                  <a:schemeClr val="bg1"/>
-                </a:solidFill>
-              </a:rPr>
-              <a:t>git fetch </a:t>
-            </a:r>
-            <a:endParaRPr lang="en-GB" dirty="0" smtClean="0">
-              <a:solidFill>
-                <a:schemeClr val="bg1"/>
-              </a:solidFill>
-            </a:endParaRPr>
-          </a:p>
-          <a:p>
-            <a:pPr marL="457200" lvl="1" indent="0">
-              <a:buNone/>
-            </a:pPr>
-            <a:r>
-              <a:rPr lang="en-GB" dirty="0" smtClean="0">
-                <a:solidFill>
-                  <a:schemeClr val="bg1"/>
-                </a:solidFill>
-              </a:rPr>
-              <a:t>git </a:t>
-            </a:r>
-            <a:r>
-              <a:rPr lang="en-GB" dirty="0">
-                <a:solidFill>
-                  <a:schemeClr val="bg1"/>
-                </a:solidFill>
-              </a:rPr>
-              <a:t>checkout test</a:t>
-            </a:r>
-          </a:p>
-        </p:txBody>
-      </p:sp>
-    </p:spTree>
-    <p:extLst>
-      <p:ext uri="{BB962C8B-B14F-4D97-AF65-F5344CB8AC3E}">
-        <p14:creationId xmlns:p14="http://schemas.microsoft.com/office/powerpoint/2010/main" val="2283585031"/>
       </p:ext>
     </p:extLst>
   </p:cSld>

</xml_diff>